<commit_message>
build(prodready): health api (#prod)
</commit_message>
<xml_diff>
--- a/docs/Diapositive.pptx
+++ b/docs/Diapositive.pptx
@@ -10,6 +10,7 @@
     <p:sldId id="261" r:id="rId4"/>
     <p:sldId id="260" r:id="rId5"/>
     <p:sldId id="264" r:id="rId6"/>
+    <p:sldId id="265" r:id="rId7"/>
   </p:sldIdLst>
   <p:sldSz cx="9144000" cy="6858000" type="screen4x3"/>
   <p:notesSz cx="6858000" cy="9144000"/>
@@ -9403,6 +9404,102 @@
 </p:sld>
 </file>
 
+<file path=ppt/slides/slide6.xml><?xml version="1.0" encoding="utf-8"?>
+<p:sld xmlns:a="http://schemas.openxmlformats.org/drawingml/2006/main" xmlns:r="http://schemas.openxmlformats.org/officeDocument/2006/relationships" xmlns:p="http://schemas.openxmlformats.org/presentationml/2006/main">
+  <p:cSld>
+    <p:spTree>
+      <p:nvGrpSpPr>
+        <p:cNvPr id="1" name=""/>
+        <p:cNvGrpSpPr/>
+        <p:nvPr/>
+      </p:nvGrpSpPr>
+      <p:grpSpPr>
+        <a:xfrm>
+          <a:off x="0" y="0"/>
+          <a:ext cx="0" cy="0"/>
+          <a:chOff x="0" y="0"/>
+          <a:chExt cx="0" cy="0"/>
+        </a:xfrm>
+      </p:grpSpPr>
+      <p:sp>
+        <p:nvSpPr>
+          <p:cNvPr id="2" name="Titre 1"/>
+          <p:cNvSpPr>
+            <a:spLocks noGrp="1"/>
+          </p:cNvSpPr>
+          <p:nvPr>
+            <p:ph type="title"/>
+          </p:nvPr>
+        </p:nvSpPr>
+        <p:spPr/>
+        <p:txBody>
+          <a:bodyPr/>
+          <a:lstStyle/>
+          <a:p>
+            <a:endParaRPr lang="en-CA"/>
+          </a:p>
+        </p:txBody>
+      </p:sp>
+      <p:sp>
+        <p:nvSpPr>
+          <p:cNvPr id="3" name="Espace réservé du contenu 2"/>
+          <p:cNvSpPr>
+            <a:spLocks noGrp="1"/>
+          </p:cNvSpPr>
+          <p:nvPr>
+            <p:ph idx="1"/>
+          </p:nvPr>
+        </p:nvSpPr>
+        <p:spPr/>
+        <p:txBody>
+          <a:bodyPr/>
+          <a:lstStyle/>
+          <a:p>
+            <a:endParaRPr lang="en-CA"/>
+          </a:p>
+        </p:txBody>
+      </p:sp>
+      <p:pic>
+        <p:nvPicPr>
+          <p:cNvPr id="1026" name="Picture 2"/>
+          <p:cNvPicPr>
+            <a:picLocks noChangeAspect="1" noChangeArrowheads="1"/>
+          </p:cNvPicPr>
+          <p:nvPr/>
+        </p:nvPicPr>
+        <p:blipFill>
+          <a:blip r:embed="rId2" cstate="print"/>
+          <a:srcRect/>
+          <a:stretch>
+            <a:fillRect/>
+          </a:stretch>
+        </p:blipFill>
+        <p:spPr bwMode="auto">
+          <a:xfrm>
+            <a:off x="0" y="0"/>
+            <a:ext cx="9145588" cy="9326563"/>
+          </a:xfrm>
+          <a:prstGeom prst="rect">
+            <a:avLst/>
+          </a:prstGeom>
+          <a:noFill/>
+          <a:ln w="9525">
+            <a:noFill/>
+            <a:miter lim="800000"/>
+            <a:headEnd/>
+            <a:tailEnd/>
+          </a:ln>
+          <a:effectLst/>
+        </p:spPr>
+      </p:pic>
+    </p:spTree>
+  </p:cSld>
+  <p:clrMapOvr>
+    <a:masterClrMapping/>
+  </p:clrMapOvr>
+</p:sld>
+</file>
+
 <file path=ppt/theme/theme1.xml><?xml version="1.0" encoding="utf-8"?>
 <a:theme xmlns:a="http://schemas.openxmlformats.org/drawingml/2006/main" name="Thème Office">
   <a:themeElements>

</xml_diff>

<commit_message>
build(prodready): api auth (#prod)
</commit_message>
<xml_diff>
--- a/docs/Diapositive.pptx
+++ b/docs/Diapositive.pptx
@@ -10,7 +10,7 @@
     <p:sldId id="261" r:id="rId4"/>
     <p:sldId id="260" r:id="rId5"/>
     <p:sldId id="264" r:id="rId6"/>
-    <p:sldId id="265" r:id="rId7"/>
+    <p:sldId id="266" r:id="rId7"/>
   </p:sldIdLst>
   <p:sldSz cx="9144000" cy="6858000" type="screen4x3"/>
   <p:notesSz cx="6858000" cy="9144000"/>
@@ -9477,7 +9477,7 @@
         <p:spPr bwMode="auto">
           <a:xfrm>
             <a:off x="0" y="0"/>
-            <a:ext cx="9145588" cy="9326563"/>
+            <a:ext cx="9144000" cy="6810047"/>
           </a:xfrm>
           <a:prstGeom prst="rect">
             <a:avLst/>

</xml_diff>

<commit_message>
doc: slides + README.md (#prod)
</commit_message>
<xml_diff>
--- a/docs/Diapositive.pptx
+++ b/docs/Diapositive.pptx
@@ -11,6 +11,7 @@
     <p:sldId id="260" r:id="rId5"/>
     <p:sldId id="264" r:id="rId6"/>
     <p:sldId id="266" r:id="rId7"/>
+    <p:sldId id="267" r:id="rId8"/>
   </p:sldIdLst>
   <p:sldSz cx="9144000" cy="6858000" type="screen4x3"/>
   <p:notesSz cx="6858000" cy="9144000"/>
@@ -9500,6 +9501,102 @@
 </p:sld>
 </file>
 
+<file path=ppt/slides/slide7.xml><?xml version="1.0" encoding="utf-8"?>
+<p:sld xmlns:a="http://schemas.openxmlformats.org/drawingml/2006/main" xmlns:r="http://schemas.openxmlformats.org/officeDocument/2006/relationships" xmlns:p="http://schemas.openxmlformats.org/presentationml/2006/main">
+  <p:cSld>
+    <p:spTree>
+      <p:nvGrpSpPr>
+        <p:cNvPr id="1" name=""/>
+        <p:cNvGrpSpPr/>
+        <p:nvPr/>
+      </p:nvGrpSpPr>
+      <p:grpSpPr>
+        <a:xfrm>
+          <a:off x="0" y="0"/>
+          <a:ext cx="0" cy="0"/>
+          <a:chOff x="0" y="0"/>
+          <a:chExt cx="0" cy="0"/>
+        </a:xfrm>
+      </p:grpSpPr>
+      <p:sp>
+        <p:nvSpPr>
+          <p:cNvPr id="2" name="Titre 1"/>
+          <p:cNvSpPr>
+            <a:spLocks noGrp="1"/>
+          </p:cNvSpPr>
+          <p:nvPr>
+            <p:ph type="title"/>
+          </p:nvPr>
+        </p:nvSpPr>
+        <p:spPr/>
+        <p:txBody>
+          <a:bodyPr/>
+          <a:lstStyle/>
+          <a:p>
+            <a:endParaRPr lang="en-CA"/>
+          </a:p>
+        </p:txBody>
+      </p:sp>
+      <p:sp>
+        <p:nvSpPr>
+          <p:cNvPr id="3" name="Espace réservé du contenu 2"/>
+          <p:cNvSpPr>
+            <a:spLocks noGrp="1"/>
+          </p:cNvSpPr>
+          <p:nvPr>
+            <p:ph idx="1"/>
+          </p:nvPr>
+        </p:nvSpPr>
+        <p:spPr/>
+        <p:txBody>
+          <a:bodyPr/>
+          <a:lstStyle/>
+          <a:p>
+            <a:endParaRPr lang="en-CA"/>
+          </a:p>
+        </p:txBody>
+      </p:sp>
+      <p:pic>
+        <p:nvPicPr>
+          <p:cNvPr id="1027" name="Picture 3"/>
+          <p:cNvPicPr>
+            <a:picLocks noChangeAspect="1" noChangeArrowheads="1"/>
+          </p:cNvPicPr>
+          <p:nvPr/>
+        </p:nvPicPr>
+        <p:blipFill>
+          <a:blip r:embed="rId2" cstate="print"/>
+          <a:srcRect/>
+          <a:stretch>
+            <a:fillRect/>
+          </a:stretch>
+        </p:blipFill>
+        <p:spPr bwMode="auto">
+          <a:xfrm>
+            <a:off x="0" y="0"/>
+            <a:ext cx="9144000" cy="8590800"/>
+          </a:xfrm>
+          <a:prstGeom prst="rect">
+            <a:avLst/>
+          </a:prstGeom>
+          <a:noFill/>
+          <a:ln w="9525">
+            <a:noFill/>
+            <a:miter lim="800000"/>
+            <a:headEnd/>
+            <a:tailEnd/>
+          </a:ln>
+          <a:effectLst/>
+        </p:spPr>
+      </p:pic>
+    </p:spTree>
+  </p:cSld>
+  <p:clrMapOvr>
+    <a:masterClrMapping/>
+  </p:clrMapOvr>
+</p:sld>
+</file>
+
 <file path=ppt/theme/theme1.xml><?xml version="1.0" encoding="utf-8"?>
 <a:theme xmlns:a="http://schemas.openxmlformats.org/drawingml/2006/main" name="Thème Office">
   <a:themeElements>

</xml_diff>

<commit_message>
doc: slides + README.md + swagger (#bonus)
</commit_message>
<xml_diff>
--- a/docs/Diapositive.pptx
+++ b/docs/Diapositive.pptx
@@ -10,8 +10,8 @@
     <p:sldId id="261" r:id="rId4"/>
     <p:sldId id="260" r:id="rId5"/>
     <p:sldId id="264" r:id="rId6"/>
-    <p:sldId id="266" r:id="rId7"/>
-    <p:sldId id="267" r:id="rId8"/>
+    <p:sldId id="267" r:id="rId7"/>
+    <p:sldId id="266" r:id="rId8"/>
   </p:sldIdLst>
   <p:sldSz cx="9144000" cy="6858000" type="screen4x3"/>
   <p:notesSz cx="6858000" cy="9144000"/>
@@ -7011,7 +7011,18 @@
             <a:pPr algn="ctr"/>
             <a:r>
               <a:rPr lang="en-US" sz="1200" dirty="0" smtClean="0"/>
-              <a:t>Web Adapter</a:t>
+              <a:t>API </a:t>
+            </a:r>
+            <a:br>
+              <a:rPr lang="en-US" sz="1200" dirty="0" smtClean="0"/>
+            </a:br>
+            <a:r>
+              <a:rPr lang="en-US" sz="1200" dirty="0" smtClean="0"/>
+              <a:t>Web </a:t>
+            </a:r>
+            <a:r>
+              <a:rPr lang="en-US" sz="1200" dirty="0" smtClean="0"/>
+              <a:t>Adapter</a:t>
             </a:r>
             <a:endParaRPr lang="en-CA" sz="1200" dirty="0"/>
           </a:p>
@@ -7173,7 +7184,7 @@
         </p:nvSpPr>
         <p:spPr>
           <a:xfrm rot="18172773">
-            <a:off x="5236788" y="3425156"/>
+            <a:off x="5465389" y="3577556"/>
             <a:ext cx="1097280" cy="365760"/>
           </a:xfrm>
           <a:prstGeom prst="rect">
@@ -7212,13 +7223,14 @@
           <p:cNvPr id="55" name="Connecteur droit avec flèche 54"/>
           <p:cNvCxnSpPr>
             <a:stCxn id="21" idx="3"/>
+            <a:endCxn id="53" idx="0"/>
           </p:cNvCxnSpPr>
           <p:nvPr/>
         </p:nvCxnSpPr>
         <p:spPr>
           <a:xfrm>
             <a:off x="5059680" y="2316480"/>
-            <a:ext cx="595859" cy="1215618"/>
+            <a:ext cx="398767" cy="1128987"/>
           </a:xfrm>
           <a:prstGeom prst="straightConnector1">
             <a:avLst/>
@@ -7471,6 +7483,369 @@
           </a:p>
         </p:txBody>
       </p:sp>
+      <p:sp>
+        <p:nvSpPr>
+          <p:cNvPr id="25" name="Rectangle 24"/>
+          <p:cNvSpPr/>
+          <p:nvPr/>
+        </p:nvSpPr>
+        <p:spPr>
+          <a:xfrm>
+            <a:off x="3962400" y="3276600"/>
+            <a:ext cx="1097280" cy="365760"/>
+          </a:xfrm>
+          <a:prstGeom prst="rect">
+            <a:avLst/>
+          </a:prstGeom>
+        </p:spPr>
+        <p:style>
+          <a:lnRef idx="2">
+            <a:schemeClr val="accent6"/>
+          </a:lnRef>
+          <a:fillRef idx="1">
+            <a:schemeClr val="lt1"/>
+          </a:fillRef>
+          <a:effectRef idx="0">
+            <a:schemeClr val="accent6"/>
+          </a:effectRef>
+          <a:fontRef idx="minor">
+            <a:schemeClr val="dk1"/>
+          </a:fontRef>
+        </p:style>
+        <p:txBody>
+          <a:bodyPr rtlCol="0" anchor="ctr"/>
+          <a:lstStyle/>
+          <a:p>
+            <a:pPr algn="ctr"/>
+            <a:r>
+              <a:rPr lang="en-US" sz="1200" dirty="0" err="1" smtClean="0"/>
+              <a:t>Usecase</a:t>
+            </a:r>
+            <a:endParaRPr lang="en-CA" sz="1200" dirty="0"/>
+          </a:p>
+        </p:txBody>
+      </p:sp>
+      <p:sp>
+        <p:nvSpPr>
+          <p:cNvPr id="26" name="Rectangle 25"/>
+          <p:cNvSpPr/>
+          <p:nvPr/>
+        </p:nvSpPr>
+        <p:spPr>
+          <a:xfrm rot="14349444">
+            <a:off x="2556654" y="3506129"/>
+            <a:ext cx="1097280" cy="365760"/>
+          </a:xfrm>
+          <a:prstGeom prst="rect">
+            <a:avLst/>
+          </a:prstGeom>
+        </p:spPr>
+        <p:style>
+          <a:lnRef idx="2">
+            <a:schemeClr val="accent6"/>
+          </a:lnRef>
+          <a:fillRef idx="1">
+            <a:schemeClr val="lt1"/>
+          </a:fillRef>
+          <a:effectRef idx="0">
+            <a:schemeClr val="accent6"/>
+          </a:effectRef>
+          <a:fontRef idx="minor">
+            <a:schemeClr val="dk1"/>
+          </a:fontRef>
+        </p:style>
+        <p:txBody>
+          <a:bodyPr rtlCol="0" anchor="ctr"/>
+          <a:lstStyle/>
+          <a:p>
+            <a:pPr algn="ctr"/>
+            <a:r>
+              <a:rPr lang="en-US" sz="1200" dirty="0" err="1" smtClean="0"/>
+              <a:t>InputPort</a:t>
+            </a:r>
+            <a:endParaRPr lang="en-CA" sz="1200" dirty="0"/>
+          </a:p>
+        </p:txBody>
+      </p:sp>
+      <p:sp>
+        <p:nvSpPr>
+          <p:cNvPr id="27" name="Rectangle 26"/>
+          <p:cNvSpPr/>
+          <p:nvPr/>
+        </p:nvSpPr>
+        <p:spPr>
+          <a:xfrm rot="14594881">
+            <a:off x="1842825" y="3818355"/>
+            <a:ext cx="1097280" cy="365760"/>
+          </a:xfrm>
+          <a:prstGeom prst="rect">
+            <a:avLst/>
+          </a:prstGeom>
+        </p:spPr>
+        <p:style>
+          <a:lnRef idx="2">
+            <a:schemeClr val="accent6"/>
+          </a:lnRef>
+          <a:fillRef idx="1">
+            <a:schemeClr val="lt1"/>
+          </a:fillRef>
+          <a:effectRef idx="0">
+            <a:schemeClr val="accent6"/>
+          </a:effectRef>
+          <a:fontRef idx="minor">
+            <a:schemeClr val="dk1"/>
+          </a:fontRef>
+        </p:style>
+        <p:txBody>
+          <a:bodyPr rtlCol="0" anchor="ctr"/>
+          <a:lstStyle/>
+          <a:p>
+            <a:pPr algn="ctr"/>
+            <a:r>
+              <a:rPr lang="en-US" sz="1200" dirty="0" smtClean="0"/>
+              <a:t>Stats </a:t>
+            </a:r>
+            <a:br>
+              <a:rPr lang="en-US" sz="1200" dirty="0" smtClean="0"/>
+            </a:br>
+            <a:r>
+              <a:rPr lang="en-US" sz="1200" dirty="0" smtClean="0"/>
+              <a:t>Web </a:t>
+            </a:r>
+            <a:r>
+              <a:rPr lang="en-US" sz="1200" dirty="0" smtClean="0"/>
+              <a:t>Adapter</a:t>
+            </a:r>
+            <a:endParaRPr lang="en-CA" sz="1200" dirty="0"/>
+          </a:p>
+        </p:txBody>
+      </p:sp>
+      <p:cxnSp>
+        <p:nvCxnSpPr>
+          <p:cNvPr id="28" name="Connecteur droit avec flèche 27"/>
+          <p:cNvCxnSpPr>
+            <a:stCxn id="25" idx="1"/>
+            <a:endCxn id="26" idx="2"/>
+          </p:cNvCxnSpPr>
+          <p:nvPr/>
+        </p:nvCxnSpPr>
+        <p:spPr>
+          <a:xfrm flipH="1">
+            <a:off x="3262311" y="3459480"/>
+            <a:ext cx="700089" cy="135770"/>
+          </a:xfrm>
+          <a:prstGeom prst="straightConnector1">
+            <a:avLst/>
+          </a:prstGeom>
+          <a:ln w="57150">
+            <a:headEnd type="none" w="med" len="med"/>
+            <a:tailEnd type="triangle" w="med" len="med"/>
+          </a:ln>
+        </p:spPr>
+        <p:style>
+          <a:lnRef idx="3">
+            <a:schemeClr val="accent6"/>
+          </a:lnRef>
+          <a:fillRef idx="0">
+            <a:schemeClr val="accent6"/>
+          </a:fillRef>
+          <a:effectRef idx="2">
+            <a:schemeClr val="accent6"/>
+          </a:effectRef>
+          <a:fontRef idx="minor">
+            <a:schemeClr val="tx1"/>
+          </a:fontRef>
+        </p:style>
+      </p:cxnSp>
+      <p:cxnSp>
+        <p:nvCxnSpPr>
+          <p:cNvPr id="29" name="Connecteur droit avec flèche 28"/>
+          <p:cNvCxnSpPr>
+            <a:stCxn id="26" idx="0"/>
+            <a:endCxn id="27" idx="2"/>
+          </p:cNvCxnSpPr>
+          <p:nvPr/>
+        </p:nvCxnSpPr>
+        <p:spPr>
+          <a:xfrm flipH="1">
+            <a:off x="2554770" y="3782768"/>
+            <a:ext cx="393507" cy="136147"/>
+          </a:xfrm>
+          <a:prstGeom prst="straightConnector1">
+            <a:avLst/>
+          </a:prstGeom>
+          <a:ln w="57150">
+            <a:headEnd type="triangle" w="med" len="med"/>
+            <a:tailEnd type="none" w="med" len="med"/>
+          </a:ln>
+        </p:spPr>
+        <p:style>
+          <a:lnRef idx="3">
+            <a:schemeClr val="accent6"/>
+          </a:lnRef>
+          <a:fillRef idx="0">
+            <a:schemeClr val="accent6"/>
+          </a:fillRef>
+          <a:effectRef idx="2">
+            <a:schemeClr val="accent6"/>
+          </a:effectRef>
+          <a:fontRef idx="minor">
+            <a:schemeClr val="tx1"/>
+          </a:fontRef>
+        </p:style>
+      </p:cxnSp>
+      <p:cxnSp>
+        <p:nvCxnSpPr>
+          <p:cNvPr id="30" name="Connecteur droit avec flèche 29"/>
+          <p:cNvCxnSpPr>
+            <a:endCxn id="27" idx="0"/>
+          </p:cNvCxnSpPr>
+          <p:nvPr/>
+        </p:nvCxnSpPr>
+        <p:spPr>
+          <a:xfrm>
+            <a:off x="790081" y="1976896"/>
+            <a:ext cx="1438079" cy="2106659"/>
+          </a:xfrm>
+          <a:prstGeom prst="straightConnector1">
+            <a:avLst/>
+          </a:prstGeom>
+          <a:ln w="76200">
+            <a:headEnd type="none" w="med" len="med"/>
+            <a:tailEnd type="triangle" w="med" len="med"/>
+          </a:ln>
+        </p:spPr>
+        <p:style>
+          <a:lnRef idx="3">
+            <a:schemeClr val="accent6"/>
+          </a:lnRef>
+          <a:fillRef idx="0">
+            <a:schemeClr val="accent6"/>
+          </a:fillRef>
+          <a:effectRef idx="2">
+            <a:schemeClr val="accent6"/>
+          </a:effectRef>
+          <a:fontRef idx="minor">
+            <a:schemeClr val="tx1"/>
+          </a:fontRef>
+        </p:style>
+      </p:cxnSp>
+      <p:cxnSp>
+        <p:nvCxnSpPr>
+          <p:cNvPr id="50" name="Connecteur droit avec flèche 49"/>
+          <p:cNvCxnSpPr>
+            <a:stCxn id="25" idx="0"/>
+            <a:endCxn id="22" idx="2"/>
+          </p:cNvCxnSpPr>
+          <p:nvPr/>
+        </p:nvCxnSpPr>
+        <p:spPr>
+          <a:xfrm flipV="1">
+            <a:off x="4511040" y="3108960"/>
+            <a:ext cx="0" cy="167640"/>
+          </a:xfrm>
+          <a:prstGeom prst="straightConnector1">
+            <a:avLst/>
+          </a:prstGeom>
+          <a:ln w="57150">
+            <a:headEnd type="none" w="med" len="med"/>
+            <a:tailEnd type="triangle" w="med" len="med"/>
+          </a:ln>
+        </p:spPr>
+        <p:style>
+          <a:lnRef idx="3">
+            <a:schemeClr val="accent6"/>
+          </a:lnRef>
+          <a:fillRef idx="0">
+            <a:schemeClr val="accent6"/>
+          </a:fillRef>
+          <a:effectRef idx="2">
+            <a:schemeClr val="accent6"/>
+          </a:effectRef>
+          <a:fontRef idx="minor">
+            <a:schemeClr val="tx1"/>
+          </a:fontRef>
+        </p:style>
+      </p:cxnSp>
+      <p:sp>
+        <p:nvSpPr>
+          <p:cNvPr id="53" name="Rectangle 52"/>
+          <p:cNvSpPr/>
+          <p:nvPr/>
+        </p:nvSpPr>
+        <p:spPr>
+          <a:xfrm rot="18018319">
+            <a:off x="5067696" y="3354870"/>
+            <a:ext cx="1097280" cy="365760"/>
+          </a:xfrm>
+          <a:prstGeom prst="rect">
+            <a:avLst/>
+          </a:prstGeom>
+        </p:spPr>
+        <p:style>
+          <a:lnRef idx="2">
+            <a:schemeClr val="accent6"/>
+          </a:lnRef>
+          <a:fillRef idx="1">
+            <a:schemeClr val="lt1"/>
+          </a:fillRef>
+          <a:effectRef idx="0">
+            <a:schemeClr val="accent6"/>
+          </a:effectRef>
+          <a:fontRef idx="minor">
+            <a:schemeClr val="dk1"/>
+          </a:fontRef>
+        </p:style>
+        <p:txBody>
+          <a:bodyPr rtlCol="0" anchor="ctr"/>
+          <a:lstStyle/>
+          <a:p>
+            <a:pPr algn="ctr"/>
+            <a:r>
+              <a:rPr lang="en-US" sz="1200" dirty="0" err="1" smtClean="0"/>
+              <a:t>OutboundPort</a:t>
+            </a:r>
+            <a:endParaRPr lang="en-CA" sz="1200" dirty="0"/>
+          </a:p>
+        </p:txBody>
+      </p:sp>
+      <p:cxnSp>
+        <p:nvCxnSpPr>
+          <p:cNvPr id="58" name="Connecteur droit avec flèche 57"/>
+          <p:cNvCxnSpPr>
+            <a:stCxn id="54" idx="0"/>
+            <a:endCxn id="53" idx="2"/>
+          </p:cNvCxnSpPr>
+          <p:nvPr/>
+        </p:nvCxnSpPr>
+        <p:spPr>
+          <a:xfrm flipH="1" flipV="1">
+            <a:off x="5774225" y="3630033"/>
+            <a:ext cx="86219" cy="31122"/>
+          </a:xfrm>
+          <a:prstGeom prst="straightConnector1">
+            <a:avLst/>
+          </a:prstGeom>
+          <a:ln w="57150">
+            <a:headEnd type="none" w="med" len="med"/>
+            <a:tailEnd type="triangle" w="med" len="med"/>
+          </a:ln>
+        </p:spPr>
+        <p:style>
+          <a:lnRef idx="3">
+            <a:schemeClr val="accent6"/>
+          </a:lnRef>
+          <a:fillRef idx="0">
+            <a:schemeClr val="accent6"/>
+          </a:fillRef>
+          <a:effectRef idx="2">
+            <a:schemeClr val="accent6"/>
+          </a:effectRef>
+          <a:fontRef idx="minor">
+            <a:schemeClr val="tx1"/>
+          </a:fontRef>
+        </p:style>
+      </p:cxnSp>
     </p:spTree>
   </p:cSld>
   <p:clrMapOvr>
@@ -9478,7 +9853,7 @@
         <p:spPr bwMode="auto">
           <a:xfrm>
             <a:off x="0" y="0"/>
-            <a:ext cx="9144000" cy="6810047"/>
+            <a:ext cx="9144000" cy="9105546"/>
           </a:xfrm>
           <a:prstGeom prst="rect">
             <a:avLst/>
@@ -9558,7 +9933,7 @@
       </p:sp>
       <p:pic>
         <p:nvPicPr>
-          <p:cNvPr id="1027" name="Picture 3"/>
+          <p:cNvPr id="2050" name="Picture 2"/>
           <p:cNvPicPr>
             <a:picLocks noChangeAspect="1" noChangeArrowheads="1"/>
           </p:cNvPicPr>
@@ -9574,7 +9949,7 @@
         <p:spPr bwMode="auto">
           <a:xfrm>
             <a:off x="0" y="0"/>
-            <a:ext cx="9144000" cy="8590800"/>
+            <a:ext cx="9144000" cy="7804680"/>
           </a:xfrm>
           <a:prstGeom prst="rect">
             <a:avLst/>

</xml_diff>